<commit_message>
Commit ngày 9.8.2023 lần 1
</commit_message>
<xml_diff>
--- a/Khoá 3/Bài 8 - 12/Lời mở đầu.pptx
+++ b/Khoá 3/Bài 8 - 12/Lời mở đầu.pptx
@@ -28,12 +28,12 @@
       <p:italic r:id="rId11"/>
     </p:embeddedFont>
     <p:embeddedFont>
-      <p:font typeface="Oswald" panose="02000503000000000000" pitchFamily="2" charset="0"/>
+      <p:font typeface="Oswald" panose="020B0604020202020204" charset="0"/>
       <p:regular r:id="rId12"/>
       <p:bold r:id="rId13"/>
     </p:embeddedFont>
     <p:embeddedFont>
-      <p:font typeface="Source Sans Pro" panose="020B0503030403020204" pitchFamily="34" charset="0"/>
+      <p:font typeface="Source Sans Pro" panose="020B0604020202020204" charset="0"/>
       <p:regular r:id="rId14"/>
       <p:bold r:id="rId15"/>
       <p:italic r:id="rId16"/>
@@ -270,6 +270,212 @@
 <file path=ppt/changesInfos/changesInfo1.xml><?xml version="1.0" encoding="utf-8"?>
 <pc:chgInfo xmlns:a="http://schemas.openxmlformats.org/drawingml/2006/main" xmlns:r="http://schemas.openxmlformats.org/officeDocument/2006/relationships" xmlns:ac="http://schemas.microsoft.com/office/drawing/2013/main/command" xmlns:pc="http://schemas.microsoft.com/office/powerpoint/2013/main/command">
   <pc:docChgLst>
+    <pc:chgData name="Quy Nguyen" userId="85becee7d21942b2" providerId="LiveId" clId="{E07F90F0-4254-4C3E-AF98-C27FFC3CB125}"/>
+    <pc:docChg chg="undo custSel addSld modSld">
+      <pc:chgData name="Quy Nguyen" userId="85becee7d21942b2" providerId="LiveId" clId="{E07F90F0-4254-4C3E-AF98-C27FFC3CB125}" dt="2021-06-26T04:59:30.204" v="116" actId="14826"/>
+      <pc:docMkLst>
+        <pc:docMk/>
+      </pc:docMkLst>
+      <pc:sldChg chg="modSp mod modTransition">
+        <pc:chgData name="Quy Nguyen" userId="85becee7d21942b2" providerId="LiveId" clId="{E07F90F0-4254-4C3E-AF98-C27FFC3CB125}" dt="2021-06-26T04:59:22.019" v="115" actId="18131"/>
+        <pc:sldMkLst>
+          <pc:docMk/>
+          <pc:sldMk cId="3692653146" sldId="263"/>
+        </pc:sldMkLst>
+        <pc:spChg chg="mod">
+          <ac:chgData name="Quy Nguyen" userId="85becee7d21942b2" providerId="LiveId" clId="{E07F90F0-4254-4C3E-AF98-C27FFC3CB125}" dt="2021-06-26T04:56:28.374" v="107" actId="962"/>
+          <ac:spMkLst>
+            <pc:docMk/>
+            <pc:sldMk cId="3692653146" sldId="263"/>
+            <ac:spMk id="29" creationId="{5FEEDDEF-5A95-4F80-B0F2-C47B5BFDFE65}"/>
+          </ac:spMkLst>
+        </pc:spChg>
+        <pc:picChg chg="mod modCrop">
+          <ac:chgData name="Quy Nguyen" userId="85becee7d21942b2" providerId="LiveId" clId="{E07F90F0-4254-4C3E-AF98-C27FFC3CB125}" dt="2021-06-26T04:59:22.019" v="115" actId="18131"/>
+          <ac:picMkLst>
+            <pc:docMk/>
+            <pc:sldMk cId="3692653146" sldId="263"/>
+            <ac:picMk id="13" creationId="{C40C410A-0098-4999-8AE1-0CB398B22671}"/>
+          </ac:picMkLst>
+        </pc:picChg>
+      </pc:sldChg>
+      <pc:sldChg chg="modSp mod modTransition">
+        <pc:chgData name="Quy Nguyen" userId="85becee7d21942b2" providerId="LiveId" clId="{E07F90F0-4254-4C3E-AF98-C27FFC3CB125}" dt="2021-06-26T04:58:50.411" v="111" actId="14826"/>
+        <pc:sldMkLst>
+          <pc:docMk/>
+          <pc:sldMk cId="3622568927" sldId="264"/>
+        </pc:sldMkLst>
+        <pc:spChg chg="mod">
+          <ac:chgData name="Quy Nguyen" userId="85becee7d21942b2" providerId="LiveId" clId="{E07F90F0-4254-4C3E-AF98-C27FFC3CB125}" dt="2021-06-26T04:51:58.371" v="4" actId="1076"/>
+          <ac:spMkLst>
+            <pc:docMk/>
+            <pc:sldMk cId="3622568927" sldId="264"/>
+            <ac:spMk id="12" creationId="{2E6C80BC-EF46-4470-9C37-D64AA304E40A}"/>
+          </ac:spMkLst>
+        </pc:spChg>
+        <pc:spChg chg="mod">
+          <ac:chgData name="Quy Nguyen" userId="85becee7d21942b2" providerId="LiveId" clId="{E07F90F0-4254-4C3E-AF98-C27FFC3CB125}" dt="2021-06-26T04:52:07.927" v="6" actId="1076"/>
+          <ac:spMkLst>
+            <pc:docMk/>
+            <pc:sldMk cId="3622568927" sldId="264"/>
+            <ac:spMk id="14" creationId="{0DDFE3BF-2C23-49F0-9FB2-5D10D8310160}"/>
+          </ac:spMkLst>
+        </pc:spChg>
+        <pc:spChg chg="mod">
+          <ac:chgData name="Quy Nguyen" userId="85becee7d21942b2" providerId="LiveId" clId="{E07F90F0-4254-4C3E-AF98-C27FFC3CB125}" dt="2021-06-26T04:52:11.828" v="7" actId="1076"/>
+          <ac:spMkLst>
+            <pc:docMk/>
+            <pc:sldMk cId="3622568927" sldId="264"/>
+            <ac:spMk id="15" creationId="{FD0C917C-5BD4-418C-AA2F-D59187251167}"/>
+          </ac:spMkLst>
+        </pc:spChg>
+        <pc:picChg chg="mod">
+          <ac:chgData name="Quy Nguyen" userId="85becee7d21942b2" providerId="LiveId" clId="{E07F90F0-4254-4C3E-AF98-C27FFC3CB125}" dt="2021-06-26T04:58:50.411" v="111" actId="14826"/>
+          <ac:picMkLst>
+            <pc:docMk/>
+            <pc:sldMk cId="3622568927" sldId="264"/>
+            <ac:picMk id="13" creationId="{C40C410A-0098-4999-8AE1-0CB398B22671}"/>
+          </ac:picMkLst>
+        </pc:picChg>
+        <pc:cxnChg chg="mod">
+          <ac:chgData name="Quy Nguyen" userId="85becee7d21942b2" providerId="LiveId" clId="{E07F90F0-4254-4C3E-AF98-C27FFC3CB125}" dt="2021-06-26T04:52:03.273" v="5" actId="1076"/>
+          <ac:cxnSpMkLst>
+            <pc:docMk/>
+            <pc:sldMk cId="3622568927" sldId="264"/>
+            <ac:cxnSpMk id="34" creationId="{B050DBB5-0BD6-4A7B-BC75-EDB1071913EA}"/>
+          </ac:cxnSpMkLst>
+        </pc:cxnChg>
+      </pc:sldChg>
+      <pc:sldChg chg="addSp delSp modSp add mod modTransition">
+        <pc:chgData name="Quy Nguyen" userId="85becee7d21942b2" providerId="LiveId" clId="{E07F90F0-4254-4C3E-AF98-C27FFC3CB125}" dt="2021-06-26T04:59:30.204" v="116" actId="14826"/>
+        <pc:sldMkLst>
+          <pc:docMk/>
+          <pc:sldMk cId="2182455883" sldId="265"/>
+        </pc:sldMkLst>
+        <pc:spChg chg="del">
+          <ac:chgData name="Quy Nguyen" userId="85becee7d21942b2" providerId="LiveId" clId="{E07F90F0-4254-4C3E-AF98-C27FFC3CB125}" dt="2021-06-26T04:52:52.813" v="10" actId="478"/>
+          <ac:spMkLst>
+            <pc:docMk/>
+            <pc:sldMk cId="2182455883" sldId="265"/>
+            <ac:spMk id="5" creationId="{C716F973-850C-4D61-A421-58F2F6564936}"/>
+          </ac:spMkLst>
+        </pc:spChg>
+        <pc:spChg chg="del">
+          <ac:chgData name="Quy Nguyen" userId="85becee7d21942b2" providerId="LiveId" clId="{E07F90F0-4254-4C3E-AF98-C27FFC3CB125}" dt="2021-06-26T04:52:58.510" v="14" actId="478"/>
+          <ac:spMkLst>
+            <pc:docMk/>
+            <pc:sldMk cId="2182455883" sldId="265"/>
+            <ac:spMk id="6" creationId="{788D4F6A-1666-4A56-AD4C-A24602C20B52}"/>
+          </ac:spMkLst>
+        </pc:spChg>
+        <pc:spChg chg="del">
+          <ac:chgData name="Quy Nguyen" userId="85becee7d21942b2" providerId="LiveId" clId="{E07F90F0-4254-4C3E-AF98-C27FFC3CB125}" dt="2021-06-26T04:52:51.250" v="9" actId="478"/>
+          <ac:spMkLst>
+            <pc:docMk/>
+            <pc:sldMk cId="2182455883" sldId="265"/>
+            <ac:spMk id="8" creationId="{59942B4C-3B33-43DC-B8C0-5D4F78E86FA0}"/>
+          </ac:spMkLst>
+        </pc:spChg>
+        <pc:spChg chg="del">
+          <ac:chgData name="Quy Nguyen" userId="85becee7d21942b2" providerId="LiveId" clId="{E07F90F0-4254-4C3E-AF98-C27FFC3CB125}" dt="2021-06-26T04:52:51.250" v="9" actId="478"/>
+          <ac:spMkLst>
+            <pc:docMk/>
+            <pc:sldMk cId="2182455883" sldId="265"/>
+            <ac:spMk id="12" creationId="{2E6C80BC-EF46-4470-9C37-D64AA304E40A}"/>
+          </ac:spMkLst>
+        </pc:spChg>
+        <pc:spChg chg="del">
+          <ac:chgData name="Quy Nguyen" userId="85becee7d21942b2" providerId="LiveId" clId="{E07F90F0-4254-4C3E-AF98-C27FFC3CB125}" dt="2021-06-26T04:52:51.250" v="9" actId="478"/>
+          <ac:spMkLst>
+            <pc:docMk/>
+            <pc:sldMk cId="2182455883" sldId="265"/>
+            <ac:spMk id="14" creationId="{0DDFE3BF-2C23-49F0-9FB2-5D10D8310160}"/>
+          </ac:spMkLst>
+        </pc:spChg>
+        <pc:spChg chg="del">
+          <ac:chgData name="Quy Nguyen" userId="85becee7d21942b2" providerId="LiveId" clId="{E07F90F0-4254-4C3E-AF98-C27FFC3CB125}" dt="2021-06-26T04:52:51.250" v="9" actId="478"/>
+          <ac:spMkLst>
+            <pc:docMk/>
+            <pc:sldMk cId="2182455883" sldId="265"/>
+            <ac:spMk id="15" creationId="{FD0C917C-5BD4-418C-AA2F-D59187251167}"/>
+          </ac:spMkLst>
+        </pc:spChg>
+        <pc:spChg chg="add mod">
+          <ac:chgData name="Quy Nguyen" userId="85becee7d21942b2" providerId="LiveId" clId="{E07F90F0-4254-4C3E-AF98-C27FFC3CB125}" dt="2021-06-26T04:56:45.250" v="108" actId="962"/>
+          <ac:spMkLst>
+            <pc:docMk/>
+            <pc:sldMk cId="2182455883" sldId="265"/>
+            <ac:spMk id="16" creationId="{1ABF479B-BF5B-4707-BCAB-2FD293B3A648}"/>
+          </ac:spMkLst>
+        </pc:spChg>
+        <pc:spChg chg="del">
+          <ac:chgData name="Quy Nguyen" userId="85becee7d21942b2" providerId="LiveId" clId="{E07F90F0-4254-4C3E-AF98-C27FFC3CB125}" dt="2021-06-26T04:52:56.880" v="13" actId="478"/>
+          <ac:spMkLst>
+            <pc:docMk/>
+            <pc:sldMk cId="2182455883" sldId="265"/>
+            <ac:spMk id="19" creationId="{EEC45ACE-1CA8-4DA8-99D5-1604C1D0F8C1}"/>
+          </ac:spMkLst>
+        </pc:spChg>
+        <pc:spChg chg="del">
+          <ac:chgData name="Quy Nguyen" userId="85becee7d21942b2" providerId="LiveId" clId="{E07F90F0-4254-4C3E-AF98-C27FFC3CB125}" dt="2021-06-26T04:52:51.250" v="9" actId="478"/>
+          <ac:spMkLst>
+            <pc:docMk/>
+            <pc:sldMk cId="2182455883" sldId="265"/>
+            <ac:spMk id="28" creationId="{600F3E19-DA6C-4F1C-BD40-575695ABFBA3}"/>
+          </ac:spMkLst>
+        </pc:spChg>
+        <pc:spChg chg="del">
+          <ac:chgData name="Quy Nguyen" userId="85becee7d21942b2" providerId="LiveId" clId="{E07F90F0-4254-4C3E-AF98-C27FFC3CB125}" dt="2021-06-26T04:52:51.250" v="9" actId="478"/>
+          <ac:spMkLst>
+            <pc:docMk/>
+            <pc:sldMk cId="2182455883" sldId="265"/>
+            <ac:spMk id="29" creationId="{5FEEDDEF-5A95-4F80-B0F2-C47B5BFDFE65}"/>
+          </ac:spMkLst>
+        </pc:spChg>
+        <pc:picChg chg="add del mod">
+          <ac:chgData name="Quy Nguyen" userId="85becee7d21942b2" providerId="LiveId" clId="{E07F90F0-4254-4C3E-AF98-C27FFC3CB125}" dt="2021-06-26T04:59:30.204" v="116" actId="14826"/>
+          <ac:picMkLst>
+            <pc:docMk/>
+            <pc:sldMk cId="2182455883" sldId="265"/>
+            <ac:picMk id="13" creationId="{C40C410A-0098-4999-8AE1-0CB398B22671}"/>
+          </ac:picMkLst>
+        </pc:picChg>
+        <pc:picChg chg="add mod">
+          <ac:chgData name="Quy Nguyen" userId="85becee7d21942b2" providerId="LiveId" clId="{E07F90F0-4254-4C3E-AF98-C27FFC3CB125}" dt="2021-06-26T04:56:02.100" v="106" actId="1076"/>
+          <ac:picMkLst>
+            <pc:docMk/>
+            <pc:sldMk cId="2182455883" sldId="265"/>
+            <ac:picMk id="1026" creationId="{9F5CBC72-9A76-4CAE-B137-544B638C5BD6}"/>
+          </ac:picMkLst>
+        </pc:picChg>
+        <pc:picChg chg="add mod">
+          <ac:chgData name="Quy Nguyen" userId="85becee7d21942b2" providerId="LiveId" clId="{E07F90F0-4254-4C3E-AF98-C27FFC3CB125}" dt="2021-06-26T04:56:02.100" v="106" actId="1076"/>
+          <ac:picMkLst>
+            <pc:docMk/>
+            <pc:sldMk cId="2182455883" sldId="265"/>
+            <ac:picMk id="1028" creationId="{C95B3A08-1089-4BF7-ACFA-908DE10922DA}"/>
+          </ac:picMkLst>
+        </pc:picChg>
+        <pc:picChg chg="add mod">
+          <ac:chgData name="Quy Nguyen" userId="85becee7d21942b2" providerId="LiveId" clId="{E07F90F0-4254-4C3E-AF98-C27FFC3CB125}" dt="2021-06-26T04:56:02.100" v="106" actId="1076"/>
+          <ac:picMkLst>
+            <pc:docMk/>
+            <pc:sldMk cId="2182455883" sldId="265"/>
+            <ac:picMk id="1030" creationId="{E9553502-E242-48A6-AB01-1301CC94E788}"/>
+          </ac:picMkLst>
+        </pc:picChg>
+        <pc:cxnChg chg="del">
+          <ac:chgData name="Quy Nguyen" userId="85becee7d21942b2" providerId="LiveId" clId="{E07F90F0-4254-4C3E-AF98-C27FFC3CB125}" dt="2021-06-26T04:52:51.250" v="9" actId="478"/>
+          <ac:cxnSpMkLst>
+            <pc:docMk/>
+            <pc:sldMk cId="2182455883" sldId="265"/>
+            <ac:cxnSpMk id="34" creationId="{B050DBB5-0BD6-4A7B-BC75-EDB1071913EA}"/>
+          </ac:cxnSpMkLst>
+        </pc:cxnChg>
+      </pc:sldChg>
+    </pc:docChg>
+  </pc:docChgLst>
+  <pc:docChgLst>
     <pc:chgData name="Quy Nguyen" userId="85becee7d21942b2" providerId="LiveId" clId="{F7E5868E-8AC9-4137-9C53-C80A793573A3}"/>
     <pc:docChg chg="undo custSel addSld delSld modSld sldOrd modMainMaster">
       <pc:chgData name="Quy Nguyen" userId="85becee7d21942b2" providerId="LiveId" clId="{F7E5868E-8AC9-4137-9C53-C80A793573A3}" dt="2021-06-04T03:14:49.743" v="1055"/>
@@ -2008,212 +2214,6 @@
             <ac:picMk id="13" creationId="{C40C410A-0098-4999-8AE1-0CB398B22671}"/>
           </ac:picMkLst>
         </pc:picChg>
-      </pc:sldChg>
-    </pc:docChg>
-  </pc:docChgLst>
-  <pc:docChgLst>
-    <pc:chgData name="Quy Nguyen" userId="85becee7d21942b2" providerId="LiveId" clId="{E07F90F0-4254-4C3E-AF98-C27FFC3CB125}"/>
-    <pc:docChg chg="undo custSel addSld modSld">
-      <pc:chgData name="Quy Nguyen" userId="85becee7d21942b2" providerId="LiveId" clId="{E07F90F0-4254-4C3E-AF98-C27FFC3CB125}" dt="2021-06-26T04:59:30.204" v="116" actId="14826"/>
-      <pc:docMkLst>
-        <pc:docMk/>
-      </pc:docMkLst>
-      <pc:sldChg chg="modSp mod modTransition">
-        <pc:chgData name="Quy Nguyen" userId="85becee7d21942b2" providerId="LiveId" clId="{E07F90F0-4254-4C3E-AF98-C27FFC3CB125}" dt="2021-06-26T04:59:22.019" v="115" actId="18131"/>
-        <pc:sldMkLst>
-          <pc:docMk/>
-          <pc:sldMk cId="3692653146" sldId="263"/>
-        </pc:sldMkLst>
-        <pc:spChg chg="mod">
-          <ac:chgData name="Quy Nguyen" userId="85becee7d21942b2" providerId="LiveId" clId="{E07F90F0-4254-4C3E-AF98-C27FFC3CB125}" dt="2021-06-26T04:56:28.374" v="107" actId="962"/>
-          <ac:spMkLst>
-            <pc:docMk/>
-            <pc:sldMk cId="3692653146" sldId="263"/>
-            <ac:spMk id="29" creationId="{5FEEDDEF-5A95-4F80-B0F2-C47B5BFDFE65}"/>
-          </ac:spMkLst>
-        </pc:spChg>
-        <pc:picChg chg="mod modCrop">
-          <ac:chgData name="Quy Nguyen" userId="85becee7d21942b2" providerId="LiveId" clId="{E07F90F0-4254-4C3E-AF98-C27FFC3CB125}" dt="2021-06-26T04:59:22.019" v="115" actId="18131"/>
-          <ac:picMkLst>
-            <pc:docMk/>
-            <pc:sldMk cId="3692653146" sldId="263"/>
-            <ac:picMk id="13" creationId="{C40C410A-0098-4999-8AE1-0CB398B22671}"/>
-          </ac:picMkLst>
-        </pc:picChg>
-      </pc:sldChg>
-      <pc:sldChg chg="modSp mod modTransition">
-        <pc:chgData name="Quy Nguyen" userId="85becee7d21942b2" providerId="LiveId" clId="{E07F90F0-4254-4C3E-AF98-C27FFC3CB125}" dt="2021-06-26T04:58:50.411" v="111" actId="14826"/>
-        <pc:sldMkLst>
-          <pc:docMk/>
-          <pc:sldMk cId="3622568927" sldId="264"/>
-        </pc:sldMkLst>
-        <pc:spChg chg="mod">
-          <ac:chgData name="Quy Nguyen" userId="85becee7d21942b2" providerId="LiveId" clId="{E07F90F0-4254-4C3E-AF98-C27FFC3CB125}" dt="2021-06-26T04:51:58.371" v="4" actId="1076"/>
-          <ac:spMkLst>
-            <pc:docMk/>
-            <pc:sldMk cId="3622568927" sldId="264"/>
-            <ac:spMk id="12" creationId="{2E6C80BC-EF46-4470-9C37-D64AA304E40A}"/>
-          </ac:spMkLst>
-        </pc:spChg>
-        <pc:spChg chg="mod">
-          <ac:chgData name="Quy Nguyen" userId="85becee7d21942b2" providerId="LiveId" clId="{E07F90F0-4254-4C3E-AF98-C27FFC3CB125}" dt="2021-06-26T04:52:07.927" v="6" actId="1076"/>
-          <ac:spMkLst>
-            <pc:docMk/>
-            <pc:sldMk cId="3622568927" sldId="264"/>
-            <ac:spMk id="14" creationId="{0DDFE3BF-2C23-49F0-9FB2-5D10D8310160}"/>
-          </ac:spMkLst>
-        </pc:spChg>
-        <pc:spChg chg="mod">
-          <ac:chgData name="Quy Nguyen" userId="85becee7d21942b2" providerId="LiveId" clId="{E07F90F0-4254-4C3E-AF98-C27FFC3CB125}" dt="2021-06-26T04:52:11.828" v="7" actId="1076"/>
-          <ac:spMkLst>
-            <pc:docMk/>
-            <pc:sldMk cId="3622568927" sldId="264"/>
-            <ac:spMk id="15" creationId="{FD0C917C-5BD4-418C-AA2F-D59187251167}"/>
-          </ac:spMkLst>
-        </pc:spChg>
-        <pc:picChg chg="mod">
-          <ac:chgData name="Quy Nguyen" userId="85becee7d21942b2" providerId="LiveId" clId="{E07F90F0-4254-4C3E-AF98-C27FFC3CB125}" dt="2021-06-26T04:58:50.411" v="111" actId="14826"/>
-          <ac:picMkLst>
-            <pc:docMk/>
-            <pc:sldMk cId="3622568927" sldId="264"/>
-            <ac:picMk id="13" creationId="{C40C410A-0098-4999-8AE1-0CB398B22671}"/>
-          </ac:picMkLst>
-        </pc:picChg>
-        <pc:cxnChg chg="mod">
-          <ac:chgData name="Quy Nguyen" userId="85becee7d21942b2" providerId="LiveId" clId="{E07F90F0-4254-4C3E-AF98-C27FFC3CB125}" dt="2021-06-26T04:52:03.273" v="5" actId="1076"/>
-          <ac:cxnSpMkLst>
-            <pc:docMk/>
-            <pc:sldMk cId="3622568927" sldId="264"/>
-            <ac:cxnSpMk id="34" creationId="{B050DBB5-0BD6-4A7B-BC75-EDB1071913EA}"/>
-          </ac:cxnSpMkLst>
-        </pc:cxnChg>
-      </pc:sldChg>
-      <pc:sldChg chg="addSp delSp modSp add mod modTransition">
-        <pc:chgData name="Quy Nguyen" userId="85becee7d21942b2" providerId="LiveId" clId="{E07F90F0-4254-4C3E-AF98-C27FFC3CB125}" dt="2021-06-26T04:59:30.204" v="116" actId="14826"/>
-        <pc:sldMkLst>
-          <pc:docMk/>
-          <pc:sldMk cId="2182455883" sldId="265"/>
-        </pc:sldMkLst>
-        <pc:spChg chg="del">
-          <ac:chgData name="Quy Nguyen" userId="85becee7d21942b2" providerId="LiveId" clId="{E07F90F0-4254-4C3E-AF98-C27FFC3CB125}" dt="2021-06-26T04:52:52.813" v="10" actId="478"/>
-          <ac:spMkLst>
-            <pc:docMk/>
-            <pc:sldMk cId="2182455883" sldId="265"/>
-            <ac:spMk id="5" creationId="{C716F973-850C-4D61-A421-58F2F6564936}"/>
-          </ac:spMkLst>
-        </pc:spChg>
-        <pc:spChg chg="del">
-          <ac:chgData name="Quy Nguyen" userId="85becee7d21942b2" providerId="LiveId" clId="{E07F90F0-4254-4C3E-AF98-C27FFC3CB125}" dt="2021-06-26T04:52:58.510" v="14" actId="478"/>
-          <ac:spMkLst>
-            <pc:docMk/>
-            <pc:sldMk cId="2182455883" sldId="265"/>
-            <ac:spMk id="6" creationId="{788D4F6A-1666-4A56-AD4C-A24602C20B52}"/>
-          </ac:spMkLst>
-        </pc:spChg>
-        <pc:spChg chg="del">
-          <ac:chgData name="Quy Nguyen" userId="85becee7d21942b2" providerId="LiveId" clId="{E07F90F0-4254-4C3E-AF98-C27FFC3CB125}" dt="2021-06-26T04:52:51.250" v="9" actId="478"/>
-          <ac:spMkLst>
-            <pc:docMk/>
-            <pc:sldMk cId="2182455883" sldId="265"/>
-            <ac:spMk id="8" creationId="{59942B4C-3B33-43DC-B8C0-5D4F78E86FA0}"/>
-          </ac:spMkLst>
-        </pc:spChg>
-        <pc:spChg chg="del">
-          <ac:chgData name="Quy Nguyen" userId="85becee7d21942b2" providerId="LiveId" clId="{E07F90F0-4254-4C3E-AF98-C27FFC3CB125}" dt="2021-06-26T04:52:51.250" v="9" actId="478"/>
-          <ac:spMkLst>
-            <pc:docMk/>
-            <pc:sldMk cId="2182455883" sldId="265"/>
-            <ac:spMk id="12" creationId="{2E6C80BC-EF46-4470-9C37-D64AA304E40A}"/>
-          </ac:spMkLst>
-        </pc:spChg>
-        <pc:spChg chg="del">
-          <ac:chgData name="Quy Nguyen" userId="85becee7d21942b2" providerId="LiveId" clId="{E07F90F0-4254-4C3E-AF98-C27FFC3CB125}" dt="2021-06-26T04:52:51.250" v="9" actId="478"/>
-          <ac:spMkLst>
-            <pc:docMk/>
-            <pc:sldMk cId="2182455883" sldId="265"/>
-            <ac:spMk id="14" creationId="{0DDFE3BF-2C23-49F0-9FB2-5D10D8310160}"/>
-          </ac:spMkLst>
-        </pc:spChg>
-        <pc:spChg chg="del">
-          <ac:chgData name="Quy Nguyen" userId="85becee7d21942b2" providerId="LiveId" clId="{E07F90F0-4254-4C3E-AF98-C27FFC3CB125}" dt="2021-06-26T04:52:51.250" v="9" actId="478"/>
-          <ac:spMkLst>
-            <pc:docMk/>
-            <pc:sldMk cId="2182455883" sldId="265"/>
-            <ac:spMk id="15" creationId="{FD0C917C-5BD4-418C-AA2F-D59187251167}"/>
-          </ac:spMkLst>
-        </pc:spChg>
-        <pc:spChg chg="add mod">
-          <ac:chgData name="Quy Nguyen" userId="85becee7d21942b2" providerId="LiveId" clId="{E07F90F0-4254-4C3E-AF98-C27FFC3CB125}" dt="2021-06-26T04:56:45.250" v="108" actId="962"/>
-          <ac:spMkLst>
-            <pc:docMk/>
-            <pc:sldMk cId="2182455883" sldId="265"/>
-            <ac:spMk id="16" creationId="{1ABF479B-BF5B-4707-BCAB-2FD293B3A648}"/>
-          </ac:spMkLst>
-        </pc:spChg>
-        <pc:spChg chg="del">
-          <ac:chgData name="Quy Nguyen" userId="85becee7d21942b2" providerId="LiveId" clId="{E07F90F0-4254-4C3E-AF98-C27FFC3CB125}" dt="2021-06-26T04:52:56.880" v="13" actId="478"/>
-          <ac:spMkLst>
-            <pc:docMk/>
-            <pc:sldMk cId="2182455883" sldId="265"/>
-            <ac:spMk id="19" creationId="{EEC45ACE-1CA8-4DA8-99D5-1604C1D0F8C1}"/>
-          </ac:spMkLst>
-        </pc:spChg>
-        <pc:spChg chg="del">
-          <ac:chgData name="Quy Nguyen" userId="85becee7d21942b2" providerId="LiveId" clId="{E07F90F0-4254-4C3E-AF98-C27FFC3CB125}" dt="2021-06-26T04:52:51.250" v="9" actId="478"/>
-          <ac:spMkLst>
-            <pc:docMk/>
-            <pc:sldMk cId="2182455883" sldId="265"/>
-            <ac:spMk id="28" creationId="{600F3E19-DA6C-4F1C-BD40-575695ABFBA3}"/>
-          </ac:spMkLst>
-        </pc:spChg>
-        <pc:spChg chg="del">
-          <ac:chgData name="Quy Nguyen" userId="85becee7d21942b2" providerId="LiveId" clId="{E07F90F0-4254-4C3E-AF98-C27FFC3CB125}" dt="2021-06-26T04:52:51.250" v="9" actId="478"/>
-          <ac:spMkLst>
-            <pc:docMk/>
-            <pc:sldMk cId="2182455883" sldId="265"/>
-            <ac:spMk id="29" creationId="{5FEEDDEF-5A95-4F80-B0F2-C47B5BFDFE65}"/>
-          </ac:spMkLst>
-        </pc:spChg>
-        <pc:picChg chg="add del mod">
-          <ac:chgData name="Quy Nguyen" userId="85becee7d21942b2" providerId="LiveId" clId="{E07F90F0-4254-4C3E-AF98-C27FFC3CB125}" dt="2021-06-26T04:59:30.204" v="116" actId="14826"/>
-          <ac:picMkLst>
-            <pc:docMk/>
-            <pc:sldMk cId="2182455883" sldId="265"/>
-            <ac:picMk id="13" creationId="{C40C410A-0098-4999-8AE1-0CB398B22671}"/>
-          </ac:picMkLst>
-        </pc:picChg>
-        <pc:picChg chg="add mod">
-          <ac:chgData name="Quy Nguyen" userId="85becee7d21942b2" providerId="LiveId" clId="{E07F90F0-4254-4C3E-AF98-C27FFC3CB125}" dt="2021-06-26T04:56:02.100" v="106" actId="1076"/>
-          <ac:picMkLst>
-            <pc:docMk/>
-            <pc:sldMk cId="2182455883" sldId="265"/>
-            <ac:picMk id="1026" creationId="{9F5CBC72-9A76-4CAE-B137-544B638C5BD6}"/>
-          </ac:picMkLst>
-        </pc:picChg>
-        <pc:picChg chg="add mod">
-          <ac:chgData name="Quy Nguyen" userId="85becee7d21942b2" providerId="LiveId" clId="{E07F90F0-4254-4C3E-AF98-C27FFC3CB125}" dt="2021-06-26T04:56:02.100" v="106" actId="1076"/>
-          <ac:picMkLst>
-            <pc:docMk/>
-            <pc:sldMk cId="2182455883" sldId="265"/>
-            <ac:picMk id="1028" creationId="{C95B3A08-1089-4BF7-ACFA-908DE10922DA}"/>
-          </ac:picMkLst>
-        </pc:picChg>
-        <pc:picChg chg="add mod">
-          <ac:chgData name="Quy Nguyen" userId="85becee7d21942b2" providerId="LiveId" clId="{E07F90F0-4254-4C3E-AF98-C27FFC3CB125}" dt="2021-06-26T04:56:02.100" v="106" actId="1076"/>
-          <ac:picMkLst>
-            <pc:docMk/>
-            <pc:sldMk cId="2182455883" sldId="265"/>
-            <ac:picMk id="1030" creationId="{E9553502-E242-48A6-AB01-1301CC94E788}"/>
-          </ac:picMkLst>
-        </pc:picChg>
-        <pc:cxnChg chg="del">
-          <ac:chgData name="Quy Nguyen" userId="85becee7d21942b2" providerId="LiveId" clId="{E07F90F0-4254-4C3E-AF98-C27FFC3CB125}" dt="2021-06-26T04:52:51.250" v="9" actId="478"/>
-          <ac:cxnSpMkLst>
-            <pc:docMk/>
-            <pc:sldMk cId="2182455883" sldId="265"/>
-            <ac:cxnSpMk id="34" creationId="{B050DBB5-0BD6-4A7B-BC75-EDB1071913EA}"/>
-          </ac:cxnSpMkLst>
-        </pc:cxnChg>
       </pc:sldChg>
     </pc:docChg>
   </pc:docChgLst>

</xml_diff>